<commit_message>
final re-run including fig: unmet social support
</commit_message>
<xml_diff>
--- a/results/figures/pptx/care_organization_experience.pptx
+++ b/results/figures/pptx/care_organization_experience.pptx
@@ -2272,7 +2272,7 @@
           <p:spPr>
             <a:xfrm>
               <a:off x="949027" y="1946776"/>
-              <a:ext cx="2153855" cy="93744"/>
+              <a:ext cx="2153855" cy="158410"/>
             </a:xfrm>
             <a:prstGeom prst="rect">
               <a:avLst/>
@@ -2297,8 +2297,8 @@
           </p:nvSpPr>
           <p:spPr>
             <a:xfrm>
-              <a:off x="949027" y="2040521"/>
-              <a:ext cx="2153855" cy="749954"/>
+              <a:off x="949027" y="2105187"/>
+              <a:ext cx="2153855" cy="760370"/>
             </a:xfrm>
             <a:prstGeom prst="rect">
               <a:avLst/>
@@ -2323,8 +2323,8 @@
           </p:nvSpPr>
           <p:spPr>
             <a:xfrm>
-              <a:off x="949027" y="2790475"/>
-              <a:ext cx="2153855" cy="1749894"/>
+              <a:off x="949027" y="2865558"/>
+              <a:ext cx="2153855" cy="1679151"/>
             </a:xfrm>
             <a:prstGeom prst="rect">
               <a:avLst/>
@@ -2349,8 +2349,8 @@
           </p:nvSpPr>
           <p:spPr>
             <a:xfrm>
-              <a:off x="949027" y="4540369"/>
-              <a:ext cx="2153855" cy="1062435"/>
+              <a:off x="949027" y="4544709"/>
+              <a:ext cx="2153855" cy="1045509"/>
             </a:xfrm>
             <a:prstGeom prst="rect">
               <a:avLst/>
@@ -2375,8 +2375,8 @@
           </p:nvSpPr>
           <p:spPr>
             <a:xfrm>
-              <a:off x="949027" y="5602805"/>
-              <a:ext cx="2153855" cy="749954"/>
+              <a:off x="949027" y="5590219"/>
+              <a:ext cx="2153855" cy="760370"/>
             </a:xfrm>
             <a:prstGeom prst="rect">
               <a:avLst/>
@@ -2401,8 +2401,8 @@
           </p:nvSpPr>
           <p:spPr>
             <a:xfrm>
-              <a:off x="949027" y="6352760"/>
-              <a:ext cx="2153855" cy="156240"/>
+              <a:off x="949027" y="6350590"/>
+              <a:ext cx="2153855" cy="158410"/>
             </a:xfrm>
             <a:prstGeom prst="rect">
               <a:avLst/>
@@ -2428,7 +2428,7 @@
           <p:spPr>
             <a:xfrm>
               <a:off x="3342200" y="1946776"/>
-              <a:ext cx="2153855" cy="93744"/>
+              <a:ext cx="2153855" cy="126728"/>
             </a:xfrm>
             <a:prstGeom prst="rect">
               <a:avLst/>
@@ -2453,8 +2453,8 @@
           </p:nvSpPr>
           <p:spPr>
             <a:xfrm>
-              <a:off x="3342200" y="2040521"/>
-              <a:ext cx="2153855" cy="2156119"/>
+              <a:off x="3342200" y="2073505"/>
+              <a:ext cx="2153855" cy="2091019"/>
             </a:xfrm>
             <a:prstGeom prst="rect">
               <a:avLst/>
@@ -2479,8 +2479,8 @@
           </p:nvSpPr>
           <p:spPr>
             <a:xfrm>
-              <a:off x="3342200" y="4196640"/>
-              <a:ext cx="2153855" cy="1749894"/>
+              <a:off x="3342200" y="4164524"/>
+              <a:ext cx="2153855" cy="1805880"/>
             </a:xfrm>
             <a:prstGeom prst="rect">
               <a:avLst/>
@@ -2505,8 +2505,8 @@
           </p:nvSpPr>
           <p:spPr>
             <a:xfrm>
-              <a:off x="3342200" y="5946534"/>
-              <a:ext cx="2153855" cy="249984"/>
+              <a:off x="3342200" y="5970404"/>
+              <a:ext cx="2153855" cy="221774"/>
             </a:xfrm>
             <a:prstGeom prst="rect">
               <a:avLst/>
@@ -2531,8 +2531,8 @@
           </p:nvSpPr>
           <p:spPr>
             <a:xfrm>
-              <a:off x="3342200" y="6196519"/>
-              <a:ext cx="2153855" cy="187488"/>
+              <a:off x="3342200" y="6192179"/>
+              <a:ext cx="2153855" cy="190092"/>
             </a:xfrm>
             <a:prstGeom prst="rect">
               <a:avLst/>
@@ -2557,8 +2557,8 @@
           </p:nvSpPr>
           <p:spPr>
             <a:xfrm>
-              <a:off x="3342200" y="6384008"/>
-              <a:ext cx="2153855" cy="124992"/>
+              <a:off x="3342200" y="6382272"/>
+              <a:ext cx="2153855" cy="126728"/>
             </a:xfrm>
             <a:prstGeom prst="rect">
               <a:avLst/>
@@ -2583,237 +2583,7 @@
           </p:nvSpPr>
           <p:spPr>
             <a:xfrm>
-              <a:off x="1813097" y="1909734"/>
-              <a:ext cx="425715" cy="135647"/>
-            </a:xfrm>
-            <a:prstGeom prst="rect">
-              <a:avLst/>
-            </a:prstGeom>
-            <a:noFill/>
-          </p:spPr>
-          <p:txBody>
-            <a:bodyPr lIns="0" rIns="0" tIns="0" bIns="0" anchorCtr="1" anchor="ctr" wrap="none"/>
-            <a:lstStyle/>
-            <a:p>
-              <a:pPr algn="l" marL="0" marR="0" indent="0">
-                <a:lnSpc>
-                  <a:spcPts val="1138"/>
-                </a:lnSpc>
-                <a:spcBef>
-                  <a:spcPts val="0"/>
-                </a:spcBef>
-                <a:spcAft>
-                  <a:spcPts val="0"/>
-                </a:spcAft>
-              </a:pPr>
-              <a:r>
-                <a:rPr sz="1138">
-                  <a:solidFill>
-                    <a:srgbClr val="000000">
-                      <a:alpha val="100000"/>
-                    </a:srgbClr>
-                  </a:solidFill>
-                  <a:latin typeface="Arial"/>
-                  <a:cs typeface="Arial"/>
-                </a:rPr>
-                <a:t>3 (2%)</a:t>
-              </a:r>
-            </a:p>
-          </p:txBody>
-        </p:sp>
-        <p:sp>
-          <p:nvSpPr>
-            <p:cNvPr id="17" name="tx17"/>
-            <p:cNvSpPr/>
-            <p:nvPr/>
-          </p:nvSpPr>
-          <p:spPr>
-            <a:xfrm>
-              <a:off x="1732711" y="2331583"/>
-              <a:ext cx="586487" cy="135647"/>
-            </a:xfrm>
-            <a:prstGeom prst="rect">
-              <a:avLst/>
-            </a:prstGeom>
-            <a:noFill/>
-          </p:spPr>
-          <p:txBody>
-            <a:bodyPr lIns="0" rIns="0" tIns="0" bIns="0" anchorCtr="1" anchor="ctr" wrap="none"/>
-            <a:lstStyle/>
-            <a:p>
-              <a:pPr algn="l" marL="0" marR="0" indent="0">
-                <a:lnSpc>
-                  <a:spcPts val="1138"/>
-                </a:lnSpc>
-                <a:spcBef>
-                  <a:spcPts val="0"/>
-                </a:spcBef>
-                <a:spcAft>
-                  <a:spcPts val="0"/>
-                </a:spcAft>
-              </a:pPr>
-              <a:r>
-                <a:rPr sz="1138">
-                  <a:solidFill>
-                    <a:srgbClr val="000000">
-                      <a:alpha val="100000"/>
-                    </a:srgbClr>
-                  </a:solidFill>
-                  <a:latin typeface="Arial"/>
-                  <a:cs typeface="Arial"/>
-                </a:rPr>
-                <a:t>24 (16%)</a:t>
-              </a:r>
-            </a:p>
-          </p:txBody>
-        </p:sp>
-        <p:sp>
-          <p:nvSpPr>
-            <p:cNvPr id="18" name="tx18"/>
-            <p:cNvSpPr/>
-            <p:nvPr/>
-          </p:nvSpPr>
-          <p:spPr>
-            <a:xfrm>
-              <a:off x="1732711" y="3581507"/>
-              <a:ext cx="586487" cy="135647"/>
-            </a:xfrm>
-            <a:prstGeom prst="rect">
-              <a:avLst/>
-            </a:prstGeom>
-            <a:noFill/>
-          </p:spPr>
-          <p:txBody>
-            <a:bodyPr lIns="0" rIns="0" tIns="0" bIns="0" anchorCtr="1" anchor="ctr" wrap="none"/>
-            <a:lstStyle/>
-            <a:p>
-              <a:pPr algn="l" marL="0" marR="0" indent="0">
-                <a:lnSpc>
-                  <a:spcPts val="1138"/>
-                </a:lnSpc>
-                <a:spcBef>
-                  <a:spcPts val="0"/>
-                </a:spcBef>
-                <a:spcAft>
-                  <a:spcPts val="0"/>
-                </a:spcAft>
-              </a:pPr>
-              <a:r>
-                <a:rPr sz="1138">
-                  <a:solidFill>
-                    <a:srgbClr val="000000">
-                      <a:alpha val="100000"/>
-                    </a:srgbClr>
-                  </a:solidFill>
-                  <a:latin typeface="Arial"/>
-                  <a:cs typeface="Arial"/>
-                </a:rPr>
-                <a:t>56 (38%)</a:t>
-              </a:r>
-            </a:p>
-          </p:txBody>
-        </p:sp>
-        <p:sp>
-          <p:nvSpPr>
-            <p:cNvPr id="19" name="tx19"/>
-            <p:cNvSpPr/>
-            <p:nvPr/>
-          </p:nvSpPr>
-          <p:spPr>
-            <a:xfrm>
-              <a:off x="1732711" y="4987672"/>
-              <a:ext cx="586487" cy="135647"/>
-            </a:xfrm>
-            <a:prstGeom prst="rect">
-              <a:avLst/>
-            </a:prstGeom>
-            <a:noFill/>
-          </p:spPr>
-          <p:txBody>
-            <a:bodyPr lIns="0" rIns="0" tIns="0" bIns="0" anchorCtr="1" anchor="ctr" wrap="none"/>
-            <a:lstStyle/>
-            <a:p>
-              <a:pPr algn="l" marL="0" marR="0" indent="0">
-                <a:lnSpc>
-                  <a:spcPts val="1138"/>
-                </a:lnSpc>
-                <a:spcBef>
-                  <a:spcPts val="0"/>
-                </a:spcBef>
-                <a:spcAft>
-                  <a:spcPts val="0"/>
-                </a:spcAft>
-              </a:pPr>
-              <a:r>
-                <a:rPr sz="1138">
-                  <a:solidFill>
-                    <a:srgbClr val="000000">
-                      <a:alpha val="100000"/>
-                    </a:srgbClr>
-                  </a:solidFill>
-                  <a:latin typeface="Arial"/>
-                  <a:cs typeface="Arial"/>
-                </a:rPr>
-                <a:t>34 (23%)</a:t>
-              </a:r>
-            </a:p>
-          </p:txBody>
-        </p:sp>
-        <p:sp>
-          <p:nvSpPr>
-            <p:cNvPr id="20" name="tx20"/>
-            <p:cNvSpPr/>
-            <p:nvPr/>
-          </p:nvSpPr>
-          <p:spPr>
-            <a:xfrm>
-              <a:off x="1732711" y="5893867"/>
-              <a:ext cx="586487" cy="135647"/>
-            </a:xfrm>
-            <a:prstGeom prst="rect">
-              <a:avLst/>
-            </a:prstGeom>
-            <a:noFill/>
-          </p:spPr>
-          <p:txBody>
-            <a:bodyPr lIns="0" rIns="0" tIns="0" bIns="0" anchorCtr="1" anchor="ctr" wrap="none"/>
-            <a:lstStyle/>
-            <a:p>
-              <a:pPr algn="l" marL="0" marR="0" indent="0">
-                <a:lnSpc>
-                  <a:spcPts val="1138"/>
-                </a:lnSpc>
-                <a:spcBef>
-                  <a:spcPts val="0"/>
-                </a:spcBef>
-                <a:spcAft>
-                  <a:spcPts val="0"/>
-                </a:spcAft>
-              </a:pPr>
-              <a:r>
-                <a:rPr sz="1138">
-                  <a:solidFill>
-                    <a:srgbClr val="000000">
-                      <a:alpha val="100000"/>
-                    </a:srgbClr>
-                  </a:solidFill>
-                  <a:latin typeface="Arial"/>
-                  <a:cs typeface="Arial"/>
-                </a:rPr>
-                <a:t>24 (16%)</a:t>
-              </a:r>
-            </a:p>
-          </p:txBody>
-        </p:sp>
-        <p:sp>
-          <p:nvSpPr>
-            <p:cNvPr id="21" name="tx21"/>
-            <p:cNvSpPr/>
-            <p:nvPr/>
-          </p:nvSpPr>
-          <p:spPr>
-            <a:xfrm>
-              <a:off x="1813097" y="6346965"/>
+              <a:off x="1813097" y="1942067"/>
               <a:ext cx="425715" cy="135647"/>
             </a:xfrm>
             <a:prstGeom prst="rect">
@@ -2853,14 +2623,14 @@
         </p:sp>
         <p:sp>
           <p:nvSpPr>
-            <p:cNvPr id="22" name="tx22"/>
-            <p:cNvSpPr/>
-            <p:nvPr/>
-          </p:nvSpPr>
-          <p:spPr>
-            <a:xfrm>
-              <a:off x="4206270" y="1909734"/>
-              <a:ext cx="425715" cy="135647"/>
+            <p:cNvPr id="17" name="tx17"/>
+            <p:cNvSpPr/>
+            <p:nvPr/>
+          </p:nvSpPr>
+          <p:spPr>
+            <a:xfrm>
+              <a:off x="1732711" y="2401457"/>
+              <a:ext cx="586487" cy="135647"/>
             </a:xfrm>
             <a:prstGeom prst="rect">
               <a:avLst/>
@@ -2892,20 +2662,20 @@
                   <a:latin typeface="Arial"/>
                   <a:cs typeface="Arial"/>
                 </a:rPr>
-                <a:t>3 (2%)</a:t>
+                <a:t>24 (17%)</a:t>
               </a:r>
             </a:p>
           </p:txBody>
         </p:sp>
         <p:sp>
           <p:nvSpPr>
-            <p:cNvPr id="23" name="tx23"/>
-            <p:cNvSpPr/>
-            <p:nvPr/>
-          </p:nvSpPr>
-          <p:spPr>
-            <a:xfrm>
-              <a:off x="4125884" y="3034665"/>
+            <p:cNvPr id="18" name="tx18"/>
+            <p:cNvSpPr/>
+            <p:nvPr/>
+          </p:nvSpPr>
+          <p:spPr>
+            <a:xfrm>
+              <a:off x="1732711" y="3621218"/>
               <a:ext cx="586487" cy="135647"/>
             </a:xfrm>
             <a:prstGeom prst="rect">
@@ -2938,20 +2708,20 @@
                   <a:latin typeface="Arial"/>
                   <a:cs typeface="Arial"/>
                 </a:rPr>
-                <a:t>69 (47%)</a:t>
+                <a:t>53 (37%)</a:t>
               </a:r>
             </a:p>
           </p:txBody>
         </p:sp>
         <p:sp>
           <p:nvSpPr>
-            <p:cNvPr id="24" name="tx24"/>
-            <p:cNvSpPr/>
-            <p:nvPr/>
-          </p:nvSpPr>
-          <p:spPr>
-            <a:xfrm>
-              <a:off x="4125884" y="4987672"/>
+            <p:cNvPr id="19" name="tx19"/>
+            <p:cNvSpPr/>
+            <p:nvPr/>
+          </p:nvSpPr>
+          <p:spPr>
+            <a:xfrm>
+              <a:off x="1732711" y="4983549"/>
               <a:ext cx="586487" cy="135647"/>
             </a:xfrm>
             <a:prstGeom prst="rect">
@@ -2984,21 +2754,21 @@
                   <a:latin typeface="Arial"/>
                   <a:cs typeface="Arial"/>
                 </a:rPr>
-                <a:t>56 (38%)</a:t>
+                <a:t>33 (23%)</a:t>
               </a:r>
             </a:p>
           </p:txBody>
         </p:sp>
         <p:sp>
           <p:nvSpPr>
-            <p:cNvPr id="25" name="tx25"/>
-            <p:cNvSpPr/>
-            <p:nvPr/>
-          </p:nvSpPr>
-          <p:spPr>
-            <a:xfrm>
-              <a:off x="4206270" y="5987612"/>
-              <a:ext cx="425715" cy="135647"/>
+            <p:cNvPr id="20" name="tx20"/>
+            <p:cNvSpPr/>
+            <p:nvPr/>
+          </p:nvSpPr>
+          <p:spPr>
+            <a:xfrm>
+              <a:off x="1732711" y="5886489"/>
+              <a:ext cx="586487" cy="135647"/>
             </a:xfrm>
             <a:prstGeom prst="rect">
               <a:avLst/>
@@ -3030,20 +2800,250 @@
                   <a:latin typeface="Arial"/>
                   <a:cs typeface="Arial"/>
                 </a:rPr>
-                <a:t>8 (5%)</a:t>
+                <a:t>24 (17%)</a:t>
               </a:r>
             </a:p>
           </p:txBody>
         </p:sp>
         <p:sp>
           <p:nvSpPr>
+            <p:cNvPr id="21" name="tx21"/>
+            <p:cNvSpPr/>
+            <p:nvPr/>
+          </p:nvSpPr>
+          <p:spPr>
+            <a:xfrm>
+              <a:off x="1813097" y="6345880"/>
+              <a:ext cx="425715" cy="135647"/>
+            </a:xfrm>
+            <a:prstGeom prst="rect">
+              <a:avLst/>
+            </a:prstGeom>
+            <a:noFill/>
+          </p:spPr>
+          <p:txBody>
+            <a:bodyPr lIns="0" rIns="0" tIns="0" bIns="0" anchorCtr="1" anchor="ctr" wrap="none"/>
+            <a:lstStyle/>
+            <a:p>
+              <a:pPr algn="l" marL="0" marR="0" indent="0">
+                <a:lnSpc>
+                  <a:spcPts val="1138"/>
+                </a:lnSpc>
+                <a:spcBef>
+                  <a:spcPts val="0"/>
+                </a:spcBef>
+                <a:spcAft>
+                  <a:spcPts val="0"/>
+                </a:spcAft>
+              </a:pPr>
+              <a:r>
+                <a:rPr sz="1138">
+                  <a:solidFill>
+                    <a:srgbClr val="000000">
+                      <a:alpha val="100000"/>
+                    </a:srgbClr>
+                  </a:solidFill>
+                  <a:latin typeface="Arial"/>
+                  <a:cs typeface="Arial"/>
+                </a:rPr>
+                <a:t>5 (3%)</a:t>
+              </a:r>
+            </a:p>
+          </p:txBody>
+        </p:sp>
+        <p:sp>
+          <p:nvSpPr>
+            <p:cNvPr id="22" name="tx22"/>
+            <p:cNvSpPr/>
+            <p:nvPr/>
+          </p:nvSpPr>
+          <p:spPr>
+            <a:xfrm>
+              <a:off x="4206270" y="1926226"/>
+              <a:ext cx="425715" cy="135647"/>
+            </a:xfrm>
+            <a:prstGeom prst="rect">
+              <a:avLst/>
+            </a:prstGeom>
+            <a:noFill/>
+          </p:spPr>
+          <p:txBody>
+            <a:bodyPr lIns="0" rIns="0" tIns="0" bIns="0" anchorCtr="1" anchor="ctr" wrap="none"/>
+            <a:lstStyle/>
+            <a:p>
+              <a:pPr algn="l" marL="0" marR="0" indent="0">
+                <a:lnSpc>
+                  <a:spcPts val="1138"/>
+                </a:lnSpc>
+                <a:spcBef>
+                  <a:spcPts val="0"/>
+                </a:spcBef>
+                <a:spcAft>
+                  <a:spcPts val="0"/>
+                </a:spcAft>
+              </a:pPr>
+              <a:r>
+                <a:rPr sz="1138">
+                  <a:solidFill>
+                    <a:srgbClr val="000000">
+                      <a:alpha val="100000"/>
+                    </a:srgbClr>
+                  </a:solidFill>
+                  <a:latin typeface="Arial"/>
+                  <a:cs typeface="Arial"/>
+                </a:rPr>
+                <a:t>4 (3%)</a:t>
+              </a:r>
+            </a:p>
+          </p:txBody>
+        </p:sp>
+        <p:sp>
+          <p:nvSpPr>
+            <p:cNvPr id="23" name="tx23"/>
+            <p:cNvSpPr/>
+            <p:nvPr/>
+          </p:nvSpPr>
+          <p:spPr>
+            <a:xfrm>
+              <a:off x="4125884" y="3035099"/>
+              <a:ext cx="586487" cy="135647"/>
+            </a:xfrm>
+            <a:prstGeom prst="rect">
+              <a:avLst/>
+            </a:prstGeom>
+            <a:noFill/>
+          </p:spPr>
+          <p:txBody>
+            <a:bodyPr lIns="0" rIns="0" tIns="0" bIns="0" anchorCtr="1" anchor="ctr" wrap="none"/>
+            <a:lstStyle/>
+            <a:p>
+              <a:pPr algn="l" marL="0" marR="0" indent="0">
+                <a:lnSpc>
+                  <a:spcPts val="1138"/>
+                </a:lnSpc>
+                <a:spcBef>
+                  <a:spcPts val="0"/>
+                </a:spcBef>
+                <a:spcAft>
+                  <a:spcPts val="0"/>
+                </a:spcAft>
+              </a:pPr>
+              <a:r>
+                <a:rPr sz="1138">
+                  <a:solidFill>
+                    <a:srgbClr val="000000">
+                      <a:alpha val="100000"/>
+                    </a:srgbClr>
+                  </a:solidFill>
+                  <a:latin typeface="Arial"/>
+                  <a:cs typeface="Arial"/>
+                </a:rPr>
+                <a:t>66 (46%)</a:t>
+              </a:r>
+            </a:p>
+          </p:txBody>
+        </p:sp>
+        <p:sp>
+          <p:nvSpPr>
+            <p:cNvPr id="24" name="tx24"/>
+            <p:cNvSpPr/>
+            <p:nvPr/>
+          </p:nvSpPr>
+          <p:spPr>
+            <a:xfrm>
+              <a:off x="4125884" y="4983549"/>
+              <a:ext cx="586487" cy="135647"/>
+            </a:xfrm>
+            <a:prstGeom prst="rect">
+              <a:avLst/>
+            </a:prstGeom>
+            <a:noFill/>
+          </p:spPr>
+          <p:txBody>
+            <a:bodyPr lIns="0" rIns="0" tIns="0" bIns="0" anchorCtr="1" anchor="ctr" wrap="none"/>
+            <a:lstStyle/>
+            <a:p>
+              <a:pPr algn="l" marL="0" marR="0" indent="0">
+                <a:lnSpc>
+                  <a:spcPts val="1138"/>
+                </a:lnSpc>
+                <a:spcBef>
+                  <a:spcPts val="0"/>
+                </a:spcBef>
+                <a:spcAft>
+                  <a:spcPts val="0"/>
+                </a:spcAft>
+              </a:pPr>
+              <a:r>
+                <a:rPr sz="1138">
+                  <a:solidFill>
+                    <a:srgbClr val="000000">
+                      <a:alpha val="100000"/>
+                    </a:srgbClr>
+                  </a:solidFill>
+                  <a:latin typeface="Arial"/>
+                  <a:cs typeface="Arial"/>
+                </a:rPr>
+                <a:t>57 (40%)</a:t>
+              </a:r>
+            </a:p>
+          </p:txBody>
+        </p:sp>
+        <p:sp>
+          <p:nvSpPr>
+            <p:cNvPr id="25" name="tx25"/>
+            <p:cNvSpPr/>
+            <p:nvPr/>
+          </p:nvSpPr>
+          <p:spPr>
+            <a:xfrm>
+              <a:off x="4206270" y="5997377"/>
+              <a:ext cx="425715" cy="135647"/>
+            </a:xfrm>
+            <a:prstGeom prst="rect">
+              <a:avLst/>
+            </a:prstGeom>
+            <a:noFill/>
+          </p:spPr>
+          <p:txBody>
+            <a:bodyPr lIns="0" rIns="0" tIns="0" bIns="0" anchorCtr="1" anchor="ctr" wrap="none"/>
+            <a:lstStyle/>
+            <a:p>
+              <a:pPr algn="l" marL="0" marR="0" indent="0">
+                <a:lnSpc>
+                  <a:spcPts val="1138"/>
+                </a:lnSpc>
+                <a:spcBef>
+                  <a:spcPts val="0"/>
+                </a:spcBef>
+                <a:spcAft>
+                  <a:spcPts val="0"/>
+                </a:spcAft>
+              </a:pPr>
+              <a:r>
+                <a:rPr sz="1138">
+                  <a:solidFill>
+                    <a:srgbClr val="000000">
+                      <a:alpha val="100000"/>
+                    </a:srgbClr>
+                  </a:solidFill>
+                  <a:latin typeface="Arial"/>
+                  <a:cs typeface="Arial"/>
+                </a:rPr>
+                <a:t>7 (5%)</a:t>
+              </a:r>
+            </a:p>
+          </p:txBody>
+        </p:sp>
+        <p:sp>
+          <p:nvSpPr>
             <p:cNvPr id="26" name="tx26"/>
             <p:cNvSpPr/>
             <p:nvPr/>
           </p:nvSpPr>
           <p:spPr>
             <a:xfrm>
-              <a:off x="4206270" y="6206349"/>
+              <a:off x="4206270" y="6203311"/>
               <a:ext cx="425715" cy="135647"/>
             </a:xfrm>
             <a:prstGeom prst="rect">
@@ -3089,7 +3089,7 @@
           </p:nvSpPr>
           <p:spPr>
             <a:xfrm>
-              <a:off x="4206270" y="6362589"/>
+              <a:off x="4206270" y="6361721"/>
               <a:ext cx="425715" cy="135647"/>
             </a:xfrm>
             <a:prstGeom prst="rect">
@@ -4106,7 +4106,7 @@
                   <a:latin typeface="Arial"/>
                   <a:cs typeface="Arial"/>
                 </a:rPr>
-                <a:t>healthcare personnel (N=146)</a:t>
+                <a:t>healthcare personnel (N=144)</a:t>
               </a:r>
             </a:p>
           </p:txBody>

</xml_diff>